<commit_message>
Segunda Parte do livro e cap
</commit_message>
<xml_diff>
--- a/Livro.ppt.pptx
+++ b/Livro.ppt.pptx
@@ -3010,7 +3010,7 @@
       </p:sp>
       <p:sp>
         <p:nvSpPr>
-          <p:cNvPr id="7" name="Subtítulo 6"/>
+          <p:cNvPr id="9" name="Subtítulo 8"/>
           <p:cNvSpPr>
             <a:spLocks noGrp="1"/>
           </p:cNvSpPr>
@@ -3020,8 +3020,8 @@
         </p:nvSpPr>
         <p:spPr>
           <a:xfrm>
-            <a:off x="8595360" y="548640"/>
-            <a:ext cx="2926080" cy="1093124"/>
+            <a:off x="8454044" y="276948"/>
+            <a:ext cx="2967643" cy="1028150"/>
           </a:xfrm>
         </p:spPr>
         <p:txBody>
@@ -3029,8 +3029,42 @@
           <a:lstStyle/>
           <a:p>
             <a:r>
-              <a:rPr lang="pt-BR" dirty="0" smtClean="0"/>
-              <a:t>Cap1</a:t>
+              <a:rPr lang="pt-BR" dirty="0" smtClean="0">
+                <a:hlinkClick r:id="rId2" action="ppaction://hlinkfile"/>
+              </a:rPr>
+              <a:t>Cap1.doc.docx</a:t>
+            </a:r>
+            <a:endParaRPr lang="pt-BR" dirty="0"/>
+          </a:p>
+        </p:txBody>
+      </p:sp>
+      <p:sp>
+        <p:nvSpPr>
+          <p:cNvPr id="10" name="CaixaDeTexto 9"/>
+          <p:cNvSpPr txBox="1"/>
+          <p:nvPr/>
+        </p:nvSpPr>
+        <p:spPr>
+          <a:xfrm>
+            <a:off x="9077499" y="2128059"/>
+            <a:ext cx="2344188" cy="369332"/>
+          </a:xfrm>
+          <a:prstGeom prst="rect">
+            <a:avLst/>
+          </a:prstGeom>
+          <a:noFill/>
+        </p:spPr>
+        <p:txBody>
+          <a:bodyPr wrap="square" rtlCol="0">
+            <a:spAutoFit/>
+          </a:bodyPr>
+          <a:lstStyle/>
+          <a:p>
+            <a:r>
+              <a:rPr lang="pt-BR" dirty="0" smtClean="0">
+                <a:hlinkClick r:id="rId3" action="ppaction://hlinkfile"/>
+              </a:rPr>
+              <a:t>Cap2.doc.docx</a:t>
             </a:r>
             <a:endParaRPr lang="pt-BR" dirty="0"/>
           </a:p>

</xml_diff>

<commit_message>
Terceira Parte do livro e cap
</commit_message>
<xml_diff>
--- a/Livro.ppt.pptx
+++ b/Livro.ppt.pptx
@@ -3070,6 +3070,40 @@
           </a:p>
         </p:txBody>
       </p:sp>
+      <p:sp>
+        <p:nvSpPr>
+          <p:cNvPr id="11" name="CaixaDeTexto 10">
+            <a:hlinkClick r:id="rId4" action="ppaction://hlinkfile"/>
+          </p:cNvPr>
+          <p:cNvSpPr txBox="1"/>
+          <p:nvPr/>
+        </p:nvSpPr>
+        <p:spPr>
+          <a:xfrm>
+            <a:off x="9077499" y="4197927"/>
+            <a:ext cx="2410690" cy="369332"/>
+          </a:xfrm>
+          <a:prstGeom prst="rect">
+            <a:avLst/>
+          </a:prstGeom>
+          <a:noFill/>
+        </p:spPr>
+        <p:txBody>
+          <a:bodyPr wrap="square" rtlCol="0">
+            <a:spAutoFit/>
+          </a:bodyPr>
+          <a:lstStyle/>
+          <a:p>
+            <a:r>
+              <a:rPr lang="pt-BR" dirty="0" smtClean="0">
+                <a:hlinkClick r:id="rId4" action="ppaction://hlinkfile"/>
+              </a:rPr>
+              <a:t>Cap3.doc.docx</a:t>
+            </a:r>
+            <a:endParaRPr lang="pt-BR" dirty="0"/>
+          </a:p>
+        </p:txBody>
+      </p:sp>
     </p:spTree>
     <p:extLst>
       <p:ext uri="{BB962C8B-B14F-4D97-AF65-F5344CB8AC3E}">

</xml_diff>

<commit_message>
Livro Atualizado com o capitulo 3
</commit_message>
<xml_diff>
--- a/Livro.ppt.pptx
+++ b/Livro.ppt.pptx
@@ -3010,7 +3010,7 @@
       </p:sp>
       <p:sp>
         <p:nvSpPr>
-          <p:cNvPr id="7" name="Subtítulo 6"/>
+          <p:cNvPr id="9" name="Subtítulo 8"/>
           <p:cNvSpPr>
             <a:spLocks noGrp="1"/>
           </p:cNvSpPr>
@@ -3020,8 +3020,8 @@
         </p:nvSpPr>
         <p:spPr>
           <a:xfrm>
-            <a:off x="8595360" y="548640"/>
-            <a:ext cx="2926080" cy="1093124"/>
+            <a:off x="8454044" y="276948"/>
+            <a:ext cx="2967643" cy="1028150"/>
           </a:xfrm>
         </p:spPr>
         <p:txBody>
@@ -3029,8 +3029,76 @@
           <a:lstStyle/>
           <a:p>
             <a:r>
-              <a:rPr lang="pt-BR" dirty="0" smtClean="0"/>
-              <a:t>Cap1</a:t>
+              <a:rPr lang="pt-BR" dirty="0" smtClean="0">
+                <a:hlinkClick r:id="rId2" action="ppaction://hlinkfile"/>
+              </a:rPr>
+              <a:t>Cap1.doc.docx</a:t>
+            </a:r>
+            <a:endParaRPr lang="pt-BR" dirty="0"/>
+          </a:p>
+        </p:txBody>
+      </p:sp>
+      <p:sp>
+        <p:nvSpPr>
+          <p:cNvPr id="10" name="CaixaDeTexto 9"/>
+          <p:cNvSpPr txBox="1"/>
+          <p:nvPr/>
+        </p:nvSpPr>
+        <p:spPr>
+          <a:xfrm>
+            <a:off x="9077499" y="2128059"/>
+            <a:ext cx="2344188" cy="369332"/>
+          </a:xfrm>
+          <a:prstGeom prst="rect">
+            <a:avLst/>
+          </a:prstGeom>
+          <a:noFill/>
+        </p:spPr>
+        <p:txBody>
+          <a:bodyPr wrap="square" rtlCol="0">
+            <a:spAutoFit/>
+          </a:bodyPr>
+          <a:lstStyle/>
+          <a:p>
+            <a:r>
+              <a:rPr lang="pt-BR" dirty="0" smtClean="0">
+                <a:hlinkClick r:id="rId3" action="ppaction://hlinkfile"/>
+              </a:rPr>
+              <a:t>Cap2.doc.docx</a:t>
+            </a:r>
+            <a:endParaRPr lang="pt-BR" dirty="0"/>
+          </a:p>
+        </p:txBody>
+      </p:sp>
+      <p:sp>
+        <p:nvSpPr>
+          <p:cNvPr id="11" name="CaixaDeTexto 10">
+            <a:hlinkClick r:id="rId4" action="ppaction://hlinkfile"/>
+          </p:cNvPr>
+          <p:cNvSpPr txBox="1"/>
+          <p:nvPr/>
+        </p:nvSpPr>
+        <p:spPr>
+          <a:xfrm>
+            <a:off x="9077499" y="4197927"/>
+            <a:ext cx="2410690" cy="369332"/>
+          </a:xfrm>
+          <a:prstGeom prst="rect">
+            <a:avLst/>
+          </a:prstGeom>
+          <a:noFill/>
+        </p:spPr>
+        <p:txBody>
+          <a:bodyPr wrap="square" rtlCol="0">
+            <a:spAutoFit/>
+          </a:bodyPr>
+          <a:lstStyle/>
+          <a:p>
+            <a:r>
+              <a:rPr lang="pt-BR" dirty="0" smtClean="0">
+                <a:hlinkClick r:id="rId4" action="ppaction://hlinkfile"/>
+              </a:rPr>
+              <a:t>Cap3.doc.docx</a:t>
             </a:r>
             <a:endParaRPr lang="pt-BR" dirty="0"/>
           </a:p>

</xml_diff>